<commit_message>
TRCRT-1 Corrections after Devoteam remarks
</commit_message>
<xml_diff>
--- a/slides/exo-fundamentals/en/010-General-Intro-XFund-en.pptx
+++ b/slides/exo-fundamentals/en/010-General-Intro-XFund-en.pptx
@@ -6,15 +6,16 @@
     <p:sldMasterId id="2147483649" r:id="rId2"/>
   </p:sldMasterIdLst>
   <p:notesMasterIdLst>
-    <p:notesMasterId r:id="rId9"/>
+    <p:notesMasterId r:id="rId10"/>
   </p:notesMasterIdLst>
   <p:sldIdLst>
     <p:sldId id="256" r:id="rId3"/>
     <p:sldId id="268" r:id="rId4"/>
     <p:sldId id="288" r:id="rId5"/>
-    <p:sldId id="289" r:id="rId6"/>
-    <p:sldId id="290" r:id="rId7"/>
-    <p:sldId id="292" r:id="rId8"/>
+    <p:sldId id="293" r:id="rId6"/>
+    <p:sldId id="289" r:id="rId7"/>
+    <p:sldId id="290" r:id="rId8"/>
+    <p:sldId id="292" r:id="rId9"/>
   </p:sldIdLst>
   <p:sldSz cx="11160125" cy="7559675"/>
   <p:notesSz cx="7772400" cy="10058400"/>
@@ -12343,8 +12344,9 @@
             <a:pPr eaLnBrk="1" hangingPunct="1"/>
             <a:r>
               <a:rPr lang="en-US" sz="2500" dirty="0" smtClean="0"/>
-              <a:t>Objectives</a:t>
-            </a:r>
+              <a:t>Program</a:t>
+            </a:r>
+            <a:endParaRPr lang="en-US" sz="2500" dirty="0" smtClean="0"/>
           </a:p>
         </p:txBody>
       </p:sp>
@@ -12373,76 +12375,46 @@
             </a:pPr>
             <a:r>
               <a:rPr lang="en-US" dirty="0" smtClean="0"/>
-              <a:t>At the end of the </a:t>
-            </a:r>
+              <a:t>Program:</a:t>
+            </a:r>
+            <a:endParaRPr lang="en-US" dirty="0" smtClean="0"/>
+          </a:p>
+          <a:p>
+            <a:pPr marL="584962" lvl="1" indent="-219361"/>
+            <a:r>
+              <a:rPr lang="en-US" dirty="0" smtClean="0"/>
+              <a:t>GateIn</a:t>
+            </a:r>
+            <a:r>
+              <a:rPr lang="en-US" dirty="0" smtClean="0"/>
+              <a:t>: about 80 minutes</a:t>
+            </a:r>
+          </a:p>
+          <a:p>
+            <a:pPr marL="584962" lvl="1" indent="-219361"/>
             <a:r>
               <a:rPr lang="en-US" dirty="0" err="1" smtClean="0"/>
               <a:t>eXo</a:t>
             </a:r>
             <a:r>
               <a:rPr lang="en-US" dirty="0" smtClean="0"/>
-              <a:t> Fundamentals Training you should know :</a:t>
+              <a:t> Social: about 20 minutes</a:t>
             </a:r>
           </a:p>
           <a:p>
             <a:pPr marL="584962" lvl="1" indent="-219361"/>
             <a:r>
               <a:rPr lang="en-US" dirty="0" smtClean="0"/>
-              <a:t>What’s GateIn, </a:t>
-            </a:r>
-            <a:r>
-              <a:rPr lang="en-US" dirty="0" err="1" smtClean="0"/>
-              <a:t>eXo</a:t>
-            </a:r>
+              <a:t>GateIn: Configuration and Customization 30 min</a:t>
+            </a:r>
+          </a:p>
+          <a:p>
+            <a:pPr marL="584962" lvl="1" indent="-219361"/>
             <a:r>
               <a:rPr lang="en-US" dirty="0" smtClean="0"/>
-              <a:t> WCM, </a:t>
-            </a:r>
-            <a:r>
-              <a:rPr lang="en-US" dirty="0" err="1" smtClean="0"/>
-              <a:t>eXo</a:t>
-            </a:r>
-            <a:r>
-              <a:rPr lang="en-US" dirty="0" smtClean="0"/>
-              <a:t> DMS, </a:t>
-            </a:r>
-            <a:r>
-              <a:rPr lang="en-US" dirty="0" err="1" smtClean="0"/>
-              <a:t>eXo</a:t>
-            </a:r>
-            <a:r>
-              <a:rPr lang="en-US" dirty="0" smtClean="0"/>
-              <a:t> KS, </a:t>
-            </a:r>
-            <a:r>
-              <a:rPr lang="en-US" dirty="0" err="1" smtClean="0"/>
-              <a:t>eXo</a:t>
-            </a:r>
-            <a:r>
-              <a:rPr lang="en-US" dirty="0" smtClean="0"/>
-              <a:t> CS?</a:t>
-            </a:r>
-          </a:p>
-          <a:p>
-            <a:pPr marL="584962" lvl="1" indent="-219361"/>
-            <a:r>
-              <a:rPr lang="en-US" dirty="0" smtClean="0"/>
-              <a:t>All functional knowledge about these tools</a:t>
-            </a:r>
-          </a:p>
-          <a:p>
-            <a:pPr marL="584962" lvl="1" indent="-219361"/>
-            <a:r>
-              <a:rPr lang="en-US" dirty="0" smtClean="0"/>
-              <a:t>Use, administrate and configure these tools</a:t>
-            </a:r>
-          </a:p>
-          <a:p>
-            <a:pPr marL="584962" lvl="1" indent="-219361"/>
-            <a:r>
-              <a:rPr lang="en-US" dirty="0" smtClean="0"/>
-              <a:t>No programming!</a:t>
-            </a:r>
+              <a:t>Questions </a:t>
+            </a:r>
+            <a:endParaRPr lang="en-US" dirty="0" smtClean="0"/>
           </a:p>
         </p:txBody>
       </p:sp>
@@ -12463,6 +12435,165 @@
 </file>
 
 <file path=ppt/slides/slide5.xml><?xml version="1.0" encoding="utf-8"?>
+<p:sld xmlns:a="http://schemas.openxmlformats.org/drawingml/2006/main" xmlns:r="http://schemas.openxmlformats.org/officeDocument/2006/relationships" xmlns:p="http://schemas.openxmlformats.org/presentationml/2006/main">
+  <p:cSld>
+    <p:spTree>
+      <p:nvGrpSpPr>
+        <p:cNvPr id="1" name=""/>
+        <p:cNvGrpSpPr/>
+        <p:nvPr/>
+      </p:nvGrpSpPr>
+      <p:grpSpPr>
+        <a:xfrm>
+          <a:off x="0" y="0"/>
+          <a:ext cx="0" cy="0"/>
+          <a:chOff x="0" y="0"/>
+          <a:chExt cx="0" cy="0"/>
+        </a:xfrm>
+      </p:grpSpPr>
+      <p:sp>
+        <p:nvSpPr>
+          <p:cNvPr id="10242" name="Rectangle 1"/>
+          <p:cNvSpPr>
+            <a:spLocks noGrp="1" noChangeArrowheads="1"/>
+          </p:cNvSpPr>
+          <p:nvPr>
+            <p:ph type="title"/>
+          </p:nvPr>
+        </p:nvSpPr>
+        <p:spPr>
+          <a:xfrm>
+            <a:off x="490435" y="255926"/>
+            <a:ext cx="10179255" cy="398655"/>
+          </a:xfrm>
+        </p:spPr>
+        <p:txBody>
+          <a:bodyPr rIns="41783" anchor="b"/>
+          <a:lstStyle/>
+          <a:p>
+            <a:pPr eaLnBrk="1" hangingPunct="1"/>
+            <a:r>
+              <a:rPr lang="en-US" sz="2500" dirty="0" smtClean="0"/>
+              <a:t>Objectives</a:t>
+            </a:r>
+          </a:p>
+        </p:txBody>
+      </p:sp>
+      <p:sp>
+        <p:nvSpPr>
+          <p:cNvPr id="10243" name="Rectangle 2"/>
+          <p:cNvSpPr>
+            <a:spLocks noGrp="1" noChangeArrowheads="1"/>
+          </p:cNvSpPr>
+          <p:nvPr>
+            <p:ph type="body" idx="1"/>
+          </p:nvPr>
+        </p:nvSpPr>
+        <p:spPr>
+          <a:xfrm>
+            <a:off x="490435" y="1801329"/>
+            <a:ext cx="10179255" cy="5089000"/>
+          </a:xfrm>
+        </p:spPr>
+        <p:txBody>
+          <a:bodyPr rIns="41783"/>
+          <a:lstStyle/>
+          <a:p>
+            <a:pPr marL="219361" indent="-216749">
+              <a:buNone/>
+            </a:pPr>
+            <a:r>
+              <a:rPr lang="en-US" dirty="0" smtClean="0"/>
+              <a:t>At the end of the </a:t>
+            </a:r>
+            <a:r>
+              <a:rPr lang="en-US" dirty="0" err="1" smtClean="0"/>
+              <a:t>eXo</a:t>
+            </a:r>
+            <a:r>
+              <a:rPr lang="en-US" dirty="0" smtClean="0"/>
+              <a:t> Fundamentals Training you should know :</a:t>
+            </a:r>
+          </a:p>
+          <a:p>
+            <a:pPr marL="584962" lvl="1" indent="-219361"/>
+            <a:r>
+              <a:rPr lang="en-US" dirty="0" smtClean="0"/>
+              <a:t>What’s GateIn, </a:t>
+            </a:r>
+            <a:r>
+              <a:rPr lang="en-US" dirty="0" err="1" smtClean="0"/>
+              <a:t>eXo</a:t>
+            </a:r>
+            <a:r>
+              <a:rPr lang="en-US" dirty="0" smtClean="0"/>
+              <a:t> WCM, </a:t>
+            </a:r>
+            <a:r>
+              <a:rPr lang="en-US" dirty="0" err="1" smtClean="0"/>
+              <a:t>eXo</a:t>
+            </a:r>
+            <a:r>
+              <a:rPr lang="en-US" dirty="0" smtClean="0"/>
+              <a:t> DMS, </a:t>
+            </a:r>
+            <a:r>
+              <a:rPr lang="en-US" dirty="0" err="1" smtClean="0"/>
+              <a:t>eXo</a:t>
+            </a:r>
+            <a:r>
+              <a:rPr lang="en-US" dirty="0" smtClean="0"/>
+              <a:t> KS, </a:t>
+            </a:r>
+            <a:r>
+              <a:rPr lang="en-US" dirty="0" err="1" smtClean="0"/>
+              <a:t>eXo</a:t>
+            </a:r>
+            <a:r>
+              <a:rPr lang="en-US" dirty="0" smtClean="0"/>
+              <a:t> CS?</a:t>
+            </a:r>
+          </a:p>
+          <a:p>
+            <a:pPr marL="584962" lvl="1" indent="-219361"/>
+            <a:r>
+              <a:rPr lang="en-US" dirty="0" smtClean="0"/>
+              <a:t>All functional knowledge about these tools</a:t>
+            </a:r>
+          </a:p>
+          <a:p>
+            <a:pPr marL="584962" lvl="1" indent="-219361"/>
+            <a:r>
+              <a:rPr lang="en-US" dirty="0" smtClean="0"/>
+              <a:t>Use, administrate and configure these tools</a:t>
+            </a:r>
+          </a:p>
+          <a:p>
+            <a:pPr marL="584962" lvl="1" indent="-219361"/>
+            <a:r>
+              <a:rPr lang="en-US" dirty="0" smtClean="0"/>
+              <a:t>No programming!</a:t>
+            </a:r>
+          </a:p>
+        </p:txBody>
+      </p:sp>
+    </p:spTree>
+  </p:cSld>
+  <p:clrMapOvr>
+    <a:masterClrMapping/>
+  </p:clrMapOvr>
+  <p:transition/>
+  <p:timing>
+    <p:tnLst>
+      <p:par>
+        <p:cTn id="1" dur="indefinite" restart="never" nodeType="tmRoot"/>
+      </p:par>
+    </p:tnLst>
+  </p:timing>
+</p:sld>
+</file>
+
+<file path=ppt/slides/slide6.xml><?xml version="1.0" encoding="utf-8"?>
 <p:sld xmlns:a="http://schemas.openxmlformats.org/drawingml/2006/main" xmlns:r="http://schemas.openxmlformats.org/officeDocument/2006/relationships" xmlns:p="http://schemas.openxmlformats.org/presentationml/2006/main">
   <p:cSld>
     <p:spTree>
@@ -13094,7 +13225,7 @@
 </p:sld>
 </file>
 
-<file path=ppt/slides/slide6.xml><?xml version="1.0" encoding="utf-8"?>
+<file path=ppt/slides/slide7.xml><?xml version="1.0" encoding="utf-8"?>
 <p:sld xmlns:a="http://schemas.openxmlformats.org/drawingml/2006/main" xmlns:r="http://schemas.openxmlformats.org/officeDocument/2006/relationships" xmlns:p="http://schemas.openxmlformats.org/presentationml/2006/main">
   <p:cSld>
     <p:spTree>

</xml_diff>

<commit_message>
for Training Paris 2009
</commit_message>
<xml_diff>
--- a/slides/exo-fundamentals/en/010-General-Intro-XFund-en.pptx
+++ b/slides/exo-fundamentals/en/010-General-Intro-XFund-en.pptx
@@ -6,15 +6,17 @@
     <p:sldMasterId id="2147483649" r:id="rId2"/>
   </p:sldMasterIdLst>
   <p:notesMasterIdLst>
-    <p:notesMasterId r:id="rId9"/>
+    <p:notesMasterId r:id="rId8"/>
   </p:notesMasterIdLst>
+  <p:handoutMasterIdLst>
+    <p:handoutMasterId r:id="rId9"/>
+  </p:handoutMasterIdLst>
   <p:sldIdLst>
     <p:sldId id="256" r:id="rId3"/>
     <p:sldId id="268" r:id="rId4"/>
-    <p:sldId id="288" r:id="rId5"/>
-    <p:sldId id="289" r:id="rId6"/>
-    <p:sldId id="290" r:id="rId7"/>
-    <p:sldId id="292" r:id="rId8"/>
+    <p:sldId id="289" r:id="rId5"/>
+    <p:sldId id="290" r:id="rId6"/>
+    <p:sldId id="292" r:id="rId7"/>
   </p:sldIdLst>
   <p:sldSz cx="11160125" cy="7559675"/>
   <p:notesSz cx="7772400" cy="10058400"/>
@@ -184,6 +186,171 @@
     </a:lvl9pPr>
   </p:defaultTextStyle>
 </p:presentation>
+</file>
+
+<file path=ppt/handoutMasters/handoutMaster1.xml><?xml version="1.0" encoding="utf-8"?>
+<p:handoutMaster xmlns:a="http://schemas.openxmlformats.org/drawingml/2006/main" xmlns:r="http://schemas.openxmlformats.org/officeDocument/2006/relationships" xmlns:p="http://schemas.openxmlformats.org/presentationml/2006/main">
+  <p:cSld>
+    <p:bg>
+      <p:bgRef idx="1001">
+        <a:schemeClr val="bg1"/>
+      </p:bgRef>
+    </p:bg>
+    <p:spTree>
+      <p:nvGrpSpPr>
+        <p:cNvPr id="1" name=""/>
+        <p:cNvGrpSpPr/>
+        <p:nvPr/>
+      </p:nvGrpSpPr>
+      <p:grpSpPr>
+        <a:xfrm>
+          <a:off x="0" y="0"/>
+          <a:ext cx="0" cy="0"/>
+          <a:chOff x="0" y="0"/>
+          <a:chExt cx="0" cy="0"/>
+        </a:xfrm>
+      </p:grpSpPr>
+      <p:sp>
+        <p:nvSpPr>
+          <p:cNvPr id="2" name="Marcador de Posição do Cabeçalho 1"/>
+          <p:cNvSpPr>
+            <a:spLocks noGrp="1"/>
+          </p:cNvSpPr>
+          <p:nvPr>
+            <p:ph type="hdr" sz="quarter"/>
+          </p:nvPr>
+        </p:nvSpPr>
+        <p:spPr>
+          <a:xfrm>
+            <a:off x="0" y="0"/>
+            <a:ext cx="3368675" cy="503238"/>
+          </a:xfrm>
+          <a:prstGeom prst="rect">
+            <a:avLst/>
+          </a:prstGeom>
+        </p:spPr>
+        <p:txBody>
+          <a:bodyPr vert="horz" lIns="91440" tIns="45720" rIns="91440" bIns="45720" rtlCol="0"/>
+          <a:lstStyle>
+            <a:lvl1pPr algn="l">
+              <a:defRPr sz="1200"/>
+            </a:lvl1pPr>
+          </a:lstStyle>
+          <a:p>
+            <a:endParaRPr lang="fr-FR"/>
+          </a:p>
+        </p:txBody>
+      </p:sp>
+      <p:sp>
+        <p:nvSpPr>
+          <p:cNvPr id="3" name="Marcador de Posição da Data 2"/>
+          <p:cNvSpPr>
+            <a:spLocks noGrp="1"/>
+          </p:cNvSpPr>
+          <p:nvPr>
+            <p:ph type="dt" sz="quarter" idx="1"/>
+          </p:nvPr>
+        </p:nvSpPr>
+        <p:spPr>
+          <a:xfrm>
+            <a:off x="4402138" y="0"/>
+            <a:ext cx="3368675" cy="503238"/>
+          </a:xfrm>
+          <a:prstGeom prst="rect">
+            <a:avLst/>
+          </a:prstGeom>
+        </p:spPr>
+        <p:txBody>
+          <a:bodyPr vert="horz" lIns="91440" tIns="45720" rIns="91440" bIns="45720" rtlCol="0"/>
+          <a:lstStyle>
+            <a:lvl1pPr algn="r">
+              <a:defRPr sz="1200"/>
+            </a:lvl1pPr>
+          </a:lstStyle>
+          <a:p>
+            <a:fld id="{FF739C1B-3EDC-4CA0-AE44-236A34CC0AAD}" type="datetimeFigureOut">
+              <a:rPr lang="fr-FR" smtClean="0"/>
+              <a:t>26/09/2010</a:t>
+            </a:fld>
+            <a:endParaRPr lang="fr-FR"/>
+          </a:p>
+        </p:txBody>
+      </p:sp>
+      <p:sp>
+        <p:nvSpPr>
+          <p:cNvPr id="4" name="Marcador de Posição do Rodapé 3"/>
+          <p:cNvSpPr>
+            <a:spLocks noGrp="1"/>
+          </p:cNvSpPr>
+          <p:nvPr>
+            <p:ph type="ftr" sz="quarter" idx="2"/>
+          </p:nvPr>
+        </p:nvSpPr>
+        <p:spPr>
+          <a:xfrm>
+            <a:off x="0" y="9553575"/>
+            <a:ext cx="3368675" cy="503238"/>
+          </a:xfrm>
+          <a:prstGeom prst="rect">
+            <a:avLst/>
+          </a:prstGeom>
+        </p:spPr>
+        <p:txBody>
+          <a:bodyPr vert="horz" lIns="91440" tIns="45720" rIns="91440" bIns="45720" rtlCol="0" anchor="b"/>
+          <a:lstStyle>
+            <a:lvl1pPr algn="l">
+              <a:defRPr sz="1200"/>
+            </a:lvl1pPr>
+          </a:lstStyle>
+          <a:p>
+            <a:endParaRPr lang="fr-FR"/>
+          </a:p>
+        </p:txBody>
+      </p:sp>
+      <p:sp>
+        <p:nvSpPr>
+          <p:cNvPr id="5" name="Marcador de Posição do Número do Diapositivo 4"/>
+          <p:cNvSpPr>
+            <a:spLocks noGrp="1"/>
+          </p:cNvSpPr>
+          <p:nvPr>
+            <p:ph type="sldNum" sz="quarter" idx="3"/>
+          </p:nvPr>
+        </p:nvSpPr>
+        <p:spPr>
+          <a:xfrm>
+            <a:off x="4402138" y="9553575"/>
+            <a:ext cx="3368675" cy="503238"/>
+          </a:xfrm>
+          <a:prstGeom prst="rect">
+            <a:avLst/>
+          </a:prstGeom>
+        </p:spPr>
+        <p:txBody>
+          <a:bodyPr vert="horz" lIns="91440" tIns="45720" rIns="91440" bIns="45720" rtlCol="0" anchor="b"/>
+          <a:lstStyle>
+            <a:lvl1pPr algn="r">
+              <a:defRPr sz="1200"/>
+            </a:lvl1pPr>
+          </a:lstStyle>
+          <a:p>
+            <a:fld id="{FB7DF5D1-C9B2-4756-B5CC-F12249319401}" type="slidenum">
+              <a:rPr lang="fr-FR" smtClean="0"/>
+              <a:t>‹nº›</a:t>
+            </a:fld>
+            <a:endParaRPr lang="fr-FR"/>
+          </a:p>
+        </p:txBody>
+      </p:sp>
+    </p:spTree>
+    <p:extLst>
+      <p:ext uri="{BB962C8B-B14F-4D97-AF65-F5344CB8AC3E}">
+        <p14:creationId xmlns:p14="http://schemas.microsoft.com/office/powerpoint/2010/main" val="3603532340"/>
+      </p:ext>
+    </p:extLst>
+  </p:cSld>
+  <p:clrMap bg1="lt1" tx1="dk1" bg2="lt2" tx2="dk2" accent1="accent1" accent2="accent2" accent3="accent3" accent4="accent4" accent5="accent5" accent6="accent6" hlink="hlink" folHlink="folHlink"/>
+</p:handoutMaster>
 </file>
 
 <file path=ppt/notesMasters/notesMaster1.xml><?xml version="1.0" encoding="utf-8"?>
@@ -12049,7 +12216,7 @@
       </p:grpSpPr>
       <p:sp>
         <p:nvSpPr>
-          <p:cNvPr id="9218" name="Rectangle 2"/>
+          <p:cNvPr id="10242" name="Rectangle 1"/>
           <p:cNvSpPr>
             <a:spLocks noGrp="1" noChangeArrowheads="1"/>
           </p:cNvSpPr>
@@ -12057,234 +12224,125 @@
             <p:ph type="title"/>
           </p:nvPr>
         </p:nvSpPr>
-        <p:spPr/>
+        <p:spPr>
+          <a:xfrm>
+            <a:off x="490435" y="255926"/>
+            <a:ext cx="10179255" cy="398655"/>
+          </a:xfrm>
+        </p:spPr>
         <p:txBody>
-          <a:bodyPr/>
+          <a:bodyPr rIns="41783" anchor="b"/>
           <a:lstStyle/>
           <a:p>
             <a:pPr eaLnBrk="1" hangingPunct="1"/>
             <a:r>
-              <a:rPr lang="en-US" dirty="0" smtClean="0"/>
-              <a:t>Welcome to eXo Webinar</a:t>
+              <a:rPr lang="en-US" sz="2500" dirty="0" smtClean="0"/>
+              <a:t>Objectives</a:t>
             </a:r>
           </a:p>
         </p:txBody>
       </p:sp>
-      <p:pic>
-        <p:nvPicPr>
-          <p:cNvPr id="9219" name="Picture 3"/>
-          <p:cNvPicPr>
-            <a:picLocks noGrp="1" noChangeAspect="1" noChangeArrowheads="1"/>
-          </p:cNvPicPr>
+      <p:sp>
+        <p:nvSpPr>
+          <p:cNvPr id="10243" name="Rectangle 2"/>
+          <p:cNvSpPr>
+            <a:spLocks noGrp="1" noChangeArrowheads="1"/>
+          </p:cNvSpPr>
           <p:nvPr>
             <p:ph type="body" idx="1"/>
           </p:nvPr>
-        </p:nvPicPr>
-        <p:blipFill>
-          <a:blip r:embed="rId2"/>
-          <a:srcRect/>
-          <a:stretch>
-            <a:fillRect/>
-          </a:stretch>
-        </p:blipFill>
+        </p:nvSpPr>
         <p:spPr>
           <a:xfrm>
-            <a:off x="7898" y="877287"/>
-            <a:ext cx="11160125" cy="5910918"/>
+            <a:off x="467494" y="1475581"/>
+            <a:ext cx="10179255" cy="5089000"/>
           </a:xfrm>
         </p:spPr>
-      </p:pic>
-      <p:sp>
-        <p:nvSpPr>
-          <p:cNvPr id="9220" name="AutoShape 4"/>
-          <p:cNvSpPr>
-            <a:spLocks/>
-          </p:cNvSpPr>
-          <p:nvPr/>
-        </p:nvSpPr>
-        <p:spPr bwMode="auto">
-          <a:xfrm>
-            <a:off x="6074586" y="1658600"/>
-            <a:ext cx="2965770" cy="837914"/>
-          </a:xfrm>
-          <a:prstGeom prst="rightArrow">
-            <a:avLst>
-              <a:gd name="adj1" fmla="val 50000"/>
-              <a:gd name="adj2" fmla="val 79919"/>
-            </a:avLst>
-          </a:prstGeom>
-          <a:solidFill>
-            <a:schemeClr val="bg1"/>
-          </a:solidFill>
-          <a:ln w="25400">
-            <a:solidFill>
-              <a:srgbClr val="000000"/>
-            </a:solidFill>
-            <a:miter lim="800000"/>
-            <a:headEnd/>
-            <a:tailEnd/>
-          </a:ln>
-        </p:spPr>
         <p:txBody>
-          <a:bodyPr wrap="none" lIns="75209" tIns="37605" rIns="75209" bIns="37605" anchor="ctr"/>
+          <a:bodyPr rIns="41783"/>
           <a:lstStyle/>
           <a:p>
-            <a:r>
-              <a:rPr lang="en-US" sz="3100" dirty="0">
-                <a:solidFill>
-                  <a:srgbClr val="FF3300"/>
-                </a:solidFill>
-              </a:rPr>
-              <a:t>Our names</a:t>
-            </a:r>
-            <a:endParaRPr lang="en-US" dirty="0">
-              <a:solidFill>
-                <a:srgbClr val="FF3300"/>
-              </a:solidFill>
-            </a:endParaRPr>
-          </a:p>
-        </p:txBody>
-      </p:sp>
-      <p:sp>
-        <p:nvSpPr>
-          <p:cNvPr id="9221" name="AutoShape 5"/>
-          <p:cNvSpPr>
-            <a:spLocks/>
-          </p:cNvSpPr>
-          <p:nvPr/>
-        </p:nvSpPr>
-        <p:spPr bwMode="auto">
-          <a:xfrm>
-            <a:off x="6135889" y="4171110"/>
-            <a:ext cx="2965771" cy="837914"/>
-          </a:xfrm>
-          <a:prstGeom prst="rightArrow">
-            <a:avLst>
-              <a:gd name="adj1" fmla="val 50000"/>
-              <a:gd name="adj2" fmla="val 79919"/>
-            </a:avLst>
-          </a:prstGeom>
-          <a:solidFill>
-            <a:schemeClr val="bg1"/>
-          </a:solidFill>
-          <a:ln w="25400">
-            <a:solidFill>
-              <a:srgbClr val="000000"/>
-            </a:solidFill>
-            <a:miter lim="800000"/>
-            <a:headEnd/>
-            <a:tailEnd/>
-          </a:ln>
-        </p:spPr>
-        <p:txBody>
-          <a:bodyPr wrap="none" lIns="75209" tIns="37605" rIns="75209" bIns="37605" anchor="ctr"/>
-          <a:lstStyle/>
-          <a:p>
-            <a:r>
-              <a:rPr lang="en-US" sz="3100" dirty="0">
-                <a:solidFill>
-                  <a:srgbClr val="FF3300"/>
-                </a:solidFill>
-              </a:rPr>
-              <a:t>Our chat</a:t>
-            </a:r>
-          </a:p>
-        </p:txBody>
-      </p:sp>
-      <p:sp>
-        <p:nvSpPr>
-          <p:cNvPr id="9222" name="AutoShape 6"/>
-          <p:cNvSpPr>
-            <a:spLocks/>
-          </p:cNvSpPr>
-          <p:nvPr/>
-        </p:nvSpPr>
-        <p:spPr bwMode="auto">
-          <a:xfrm rot="-5400000">
-            <a:off x="-176567" y="2032029"/>
-            <a:ext cx="2678616" cy="927739"/>
-          </a:xfrm>
-          <a:prstGeom prst="rightArrow">
-            <a:avLst>
-              <a:gd name="adj1" fmla="val 50000"/>
-              <a:gd name="adj2" fmla="val 79919"/>
-            </a:avLst>
-          </a:prstGeom>
-          <a:solidFill>
-            <a:schemeClr val="bg1"/>
-          </a:solidFill>
-          <a:ln w="25400">
-            <a:solidFill>
-              <a:srgbClr val="000000"/>
-            </a:solidFill>
-            <a:miter lim="800000"/>
-            <a:headEnd/>
-            <a:tailEnd/>
-          </a:ln>
-        </p:spPr>
-        <p:txBody>
-          <a:bodyPr wrap="none" lIns="75209" tIns="37605" rIns="75209" bIns="37605" anchor="ctr"/>
-          <a:lstStyle/>
-          <a:p>
-            <a:r>
-              <a:rPr lang="en-US" sz="3100" dirty="0">
-                <a:solidFill>
-                  <a:srgbClr val="FF3300"/>
-                </a:solidFill>
-              </a:rPr>
-              <a:t>Audio</a:t>
-            </a:r>
-            <a:endParaRPr lang="en-US" sz="2500" dirty="0">
-              <a:solidFill>
-                <a:srgbClr val="FF3300"/>
-              </a:solidFill>
-            </a:endParaRPr>
-          </a:p>
-        </p:txBody>
-      </p:sp>
-      <p:sp>
-        <p:nvSpPr>
-          <p:cNvPr id="9223" name="Text Box 7"/>
-          <p:cNvSpPr txBox="1">
-            <a:spLocks/>
-          </p:cNvSpPr>
-          <p:nvPr/>
-        </p:nvSpPr>
-        <p:spPr bwMode="auto">
-          <a:xfrm>
-            <a:off x="9059428" y="2105242"/>
-            <a:ext cx="2100697" cy="424245"/>
-          </a:xfrm>
-          <a:prstGeom prst="rect">
-            <a:avLst/>
-          </a:prstGeom>
-          <a:noFill/>
-          <a:ln w="25400">
-            <a:noFill/>
-            <a:miter lim="800000"/>
-            <a:headEnd/>
-            <a:tailEnd/>
-          </a:ln>
-        </p:spPr>
-        <p:txBody>
-          <a:bodyPr lIns="75209" tIns="37605" rIns="75209" bIns="37605">
-            <a:spAutoFit/>
-          </a:bodyPr>
-          <a:lstStyle/>
-          <a:p>
-            <a:pPr>
-              <a:spcBef>
-                <a:spcPct val="50000"/>
-              </a:spcBef>
+            <a:pPr marL="219361" indent="-216749">
+              <a:buNone/>
             </a:pPr>
             <a:r>
-              <a:rPr lang="en-US" sz="1600" dirty="0">
-                <a:solidFill>
-                  <a:srgbClr val="FF3300"/>
-                </a:solidFill>
-              </a:rPr>
-              <a:t>Here you can mute your microphone</a:t>
-            </a:r>
+              <a:rPr lang="en-US" dirty="0" smtClean="0"/>
+              <a:t>At the end of the eXo Fundamentals Training you should know :</a:t>
+            </a:r>
+          </a:p>
+          <a:p>
+            <a:pPr marL="584962" lvl="1" indent="-219361"/>
+            <a:r>
+              <a:rPr lang="en-US" dirty="0"/>
+              <a:t>What’s </a:t>
+            </a:r>
+            <a:r>
+              <a:rPr lang="en-US" dirty="0" smtClean="0"/>
+              <a:t>eXo Platform 3.0?</a:t>
+            </a:r>
+            <a:endParaRPr lang="en-US" dirty="0"/>
+          </a:p>
+          <a:p>
+            <a:pPr marL="584962" lvl="1" indent="-219361"/>
+            <a:r>
+              <a:rPr lang="en-US" dirty="0"/>
+              <a:t>What’s GateIn, eXo Content, eXo Knowledge, eXo Collaboration?</a:t>
+            </a:r>
+          </a:p>
+          <a:p>
+            <a:pPr marL="584962" lvl="1" indent="-219361"/>
+            <a:r>
+              <a:rPr lang="en-US" dirty="0" smtClean="0"/>
+              <a:t>All </a:t>
+            </a:r>
+            <a:r>
+              <a:rPr lang="en-US" dirty="0" smtClean="0"/>
+              <a:t>functional knowledge about these </a:t>
+            </a:r>
+            <a:r>
+              <a:rPr lang="en-US" dirty="0" smtClean="0"/>
+              <a:t>products</a:t>
+            </a:r>
+          </a:p>
+          <a:p>
+            <a:pPr marL="584962" lvl="1" indent="-219361"/>
+            <a:r>
+              <a:rPr lang="en-US" dirty="0" smtClean="0"/>
+              <a:t>Being able to make presentations about these products</a:t>
+            </a:r>
+            <a:endParaRPr lang="en-US" dirty="0" smtClean="0"/>
+          </a:p>
+          <a:p>
+            <a:pPr marL="584962" lvl="1" indent="-219361"/>
+            <a:r>
+              <a:rPr lang="en-US" dirty="0" smtClean="0"/>
+              <a:t>Use</a:t>
+            </a:r>
+            <a:r>
+              <a:rPr lang="en-US" dirty="0"/>
+              <a:t> </a:t>
+            </a:r>
+            <a:r>
+              <a:rPr lang="en-US" dirty="0" smtClean="0"/>
+              <a:t>and</a:t>
+            </a:r>
+            <a:r>
+              <a:rPr lang="en-US" dirty="0" smtClean="0"/>
+              <a:t> administrate these products</a:t>
+            </a:r>
+            <a:endParaRPr lang="en-US" dirty="0" smtClean="0"/>
+          </a:p>
+          <a:p>
+            <a:pPr marL="584962" lvl="1" indent="-219361"/>
+            <a:r>
+              <a:rPr lang="en-US" dirty="0" smtClean="0"/>
+              <a:t>No </a:t>
+            </a:r>
+            <a:r>
+              <a:rPr lang="en-US" dirty="0" smtClean="0"/>
+              <a:t>coding!</a:t>
+            </a:r>
+            <a:endParaRPr lang="en-US" dirty="0" smtClean="0"/>
           </a:p>
         </p:txBody>
       </p:sp>
@@ -12323,7 +12381,7 @@
       </p:grpSpPr>
       <p:sp>
         <p:nvSpPr>
-          <p:cNvPr id="10242" name="Rectangle 1"/>
+          <p:cNvPr id="11266" name="Rectangle 1"/>
           <p:cNvSpPr>
             <a:spLocks noGrp="1" noChangeArrowheads="1"/>
           </p:cNvSpPr>
@@ -12344,138 +12402,6 @@
             <a:pPr eaLnBrk="1" hangingPunct="1"/>
             <a:r>
               <a:rPr lang="en-US" sz="2500" dirty="0" smtClean="0"/>
-              <a:t>Objectives</a:t>
-            </a:r>
-          </a:p>
-        </p:txBody>
-      </p:sp>
-      <p:sp>
-        <p:nvSpPr>
-          <p:cNvPr id="10243" name="Rectangle 2"/>
-          <p:cNvSpPr>
-            <a:spLocks noGrp="1" noChangeArrowheads="1"/>
-          </p:cNvSpPr>
-          <p:nvPr>
-            <p:ph type="body" idx="1"/>
-          </p:nvPr>
-        </p:nvSpPr>
-        <p:spPr>
-          <a:xfrm>
-            <a:off x="490435" y="1801329"/>
-            <a:ext cx="10179255" cy="5089000"/>
-          </a:xfrm>
-        </p:spPr>
-        <p:txBody>
-          <a:bodyPr rIns="41783"/>
-          <a:lstStyle/>
-          <a:p>
-            <a:pPr marL="219361" indent="-216749">
-              <a:buNone/>
-            </a:pPr>
-            <a:r>
-              <a:rPr lang="en-US" dirty="0" smtClean="0"/>
-              <a:t>At the end of the eXo Fundamentals Training you should know :</a:t>
-            </a:r>
-          </a:p>
-          <a:p>
-            <a:pPr marL="584962" lvl="1" indent="-219361"/>
-            <a:r>
-              <a:rPr lang="en-US" dirty="0" smtClean="0"/>
-              <a:t>What’s GateIn, eXo </a:t>
-            </a:r>
-            <a:r>
-              <a:rPr lang="en-US" dirty="0" smtClean="0"/>
-              <a:t>Content, eXo Knowledge, </a:t>
-            </a:r>
-            <a:r>
-              <a:rPr lang="en-US" dirty="0" smtClean="0"/>
-              <a:t>eXo </a:t>
-            </a:r>
-            <a:r>
-              <a:rPr lang="en-US" dirty="0" smtClean="0"/>
-              <a:t>Collaboration?</a:t>
-            </a:r>
-            <a:endParaRPr lang="en-US" dirty="0" smtClean="0"/>
-          </a:p>
-          <a:p>
-            <a:pPr marL="584962" lvl="1" indent="-219361"/>
-            <a:r>
-              <a:rPr lang="en-US" dirty="0" smtClean="0"/>
-              <a:t>All functional knowledge about these tools</a:t>
-            </a:r>
-          </a:p>
-          <a:p>
-            <a:pPr marL="584962" lvl="1" indent="-219361"/>
-            <a:r>
-              <a:rPr lang="en-US" dirty="0" smtClean="0"/>
-              <a:t>Use, administrate and configure these tools</a:t>
-            </a:r>
-          </a:p>
-          <a:p>
-            <a:pPr marL="584962" lvl="1" indent="-219361"/>
-            <a:r>
-              <a:rPr lang="en-US" dirty="0" smtClean="0"/>
-              <a:t>No programming!</a:t>
-            </a:r>
-          </a:p>
-        </p:txBody>
-      </p:sp>
-    </p:spTree>
-  </p:cSld>
-  <p:clrMapOvr>
-    <a:masterClrMapping/>
-  </p:clrMapOvr>
-  <p:transition/>
-  <p:timing>
-    <p:tnLst>
-      <p:par>
-        <p:cTn id="1" dur="indefinite" restart="never" nodeType="tmRoot"/>
-      </p:par>
-    </p:tnLst>
-  </p:timing>
-</p:sld>
-</file>
-
-<file path=ppt/slides/slide5.xml><?xml version="1.0" encoding="utf-8"?>
-<p:sld xmlns:a="http://schemas.openxmlformats.org/drawingml/2006/main" xmlns:r="http://schemas.openxmlformats.org/officeDocument/2006/relationships" xmlns:p="http://schemas.openxmlformats.org/presentationml/2006/main">
-  <p:cSld>
-    <p:spTree>
-      <p:nvGrpSpPr>
-        <p:cNvPr id="1" name=""/>
-        <p:cNvGrpSpPr/>
-        <p:nvPr/>
-      </p:nvGrpSpPr>
-      <p:grpSpPr>
-        <a:xfrm>
-          <a:off x="0" y="0"/>
-          <a:ext cx="0" cy="0"/>
-          <a:chOff x="0" y="0"/>
-          <a:chExt cx="0" cy="0"/>
-        </a:xfrm>
-      </p:grpSpPr>
-      <p:sp>
-        <p:nvSpPr>
-          <p:cNvPr id="11266" name="Rectangle 1"/>
-          <p:cNvSpPr>
-            <a:spLocks noGrp="1" noChangeArrowheads="1"/>
-          </p:cNvSpPr>
-          <p:nvPr>
-            <p:ph type="title"/>
-          </p:nvPr>
-        </p:nvSpPr>
-        <p:spPr>
-          <a:xfrm>
-            <a:off x="490435" y="255926"/>
-            <a:ext cx="10179255" cy="398655"/>
-          </a:xfrm>
-        </p:spPr>
-        <p:txBody>
-          <a:bodyPr rIns="41783" anchor="b"/>
-          <a:lstStyle/>
-          <a:p>
-            <a:pPr eaLnBrk="1" hangingPunct="1"/>
-            <a:r>
-              <a:rPr lang="en-US" sz="2500" dirty="0" smtClean="0"/>
               <a:t>Agenda</a:t>
             </a:r>
           </a:p>
@@ -12490,7 +12416,7 @@
           <p:nvPr>
             <p:extLst>
               <p:ext uri="{D42A27DB-BD31-4B8C-83A1-F6EECF244321}">
-                <p14:modId xmlns:p14="http://schemas.microsoft.com/office/powerpoint/2010/main" val="2205943303"/>
+                <p14:modId xmlns:p14="http://schemas.microsoft.com/office/powerpoint/2010/main" val="2961798941"/>
               </p:ext>
             </p:extLst>
           </p:nvPr>
@@ -12633,7 +12559,39 @@
                           <a:cs typeface="Arial Unicode MS" pitchFamily="34" charset="-128"/>
                           <a:sym typeface="Helvetica Neue Light" charset="0"/>
                         </a:rPr>
-                        <a:t>Introduction, eXo Portal/GateIn presentation, GateIn Front Office and </a:t>
+                        <a:t>Introduction, eXo Portal/GateIn </a:t>
+                      </a:r>
+                      <a:r>
+                        <a:rPr kumimoji="0" lang="en-US" sz="1900" b="1" i="0" u="none" strike="noStrike" cap="none" normalizeH="0" baseline="0" dirty="0" smtClean="0">
+                          <a:ln>
+                            <a:noFill/>
+                          </a:ln>
+                          <a:solidFill>
+                            <a:srgbClr val="333333"/>
+                          </a:solidFill>
+                          <a:effectLst/>
+                          <a:latin typeface="Arial Unicode MS" pitchFamily="34" charset="-128"/>
+                          <a:ea typeface="Arial Unicode MS" pitchFamily="34" charset="-128"/>
+                          <a:cs typeface="Arial Unicode MS" pitchFamily="34" charset="-128"/>
+                          <a:sym typeface="Helvetica Neue Light" charset="0"/>
+                        </a:rPr>
+                        <a:t>Presentation</a:t>
+                      </a:r>
+                      <a:r>
+                        <a:rPr kumimoji="0" lang="en-US" sz="1900" b="1" i="0" u="none" strike="noStrike" cap="none" normalizeH="0" baseline="0" dirty="0" smtClean="0">
+                          <a:ln>
+                            <a:noFill/>
+                          </a:ln>
+                          <a:solidFill>
+                            <a:srgbClr val="333333"/>
+                          </a:solidFill>
+                          <a:effectLst/>
+                          <a:latin typeface="Arial Unicode MS" pitchFamily="34" charset="-128"/>
+                          <a:ea typeface="Arial Unicode MS" pitchFamily="34" charset="-128"/>
+                          <a:cs typeface="Arial Unicode MS" pitchFamily="34" charset="-128"/>
+                          <a:sym typeface="Helvetica Neue Light" charset="0"/>
+                        </a:rPr>
+                        <a:t>, GateIn Front Office and </a:t>
                       </a:r>
                       <a:r>
                         <a:rPr kumimoji="0" lang="en-US" sz="1900" b="1" i="0" u="none" strike="noStrike" cap="none" normalizeH="0" baseline="0" dirty="0" err="1" smtClean="0">
@@ -12665,7 +12623,7 @@
                           <a:cs typeface="Arial Unicode MS" pitchFamily="34" charset="-128"/>
                           <a:sym typeface="Helvetica Neue Light" charset="0"/>
                         </a:rPr>
-                        <a:t>, </a:t>
+                        <a:t>, eXo Content Front Office </a:t>
                       </a:r>
                       <a:r>
                         <a:rPr kumimoji="0" lang="en-US" sz="1900" b="1" i="0" u="none" strike="noStrike" cap="none" normalizeH="0" baseline="0" dirty="0" smtClean="0">
@@ -12681,39 +12639,7 @@
                           <a:cs typeface="Arial Unicode MS" pitchFamily="34" charset="-128"/>
                           <a:sym typeface="Helvetica Neue Light" charset="0"/>
                         </a:rPr>
-                        <a:t>eXo Content Front </a:t>
-                      </a:r>
-                      <a:r>
-                        <a:rPr kumimoji="0" lang="en-US" sz="1900" b="1" i="0" u="none" strike="noStrike" cap="none" normalizeH="0" baseline="0" dirty="0" smtClean="0">
-                          <a:ln>
-                            <a:noFill/>
-                          </a:ln>
-                          <a:solidFill>
-                            <a:srgbClr val="333333"/>
-                          </a:solidFill>
-                          <a:effectLst/>
-                          <a:latin typeface="Arial Unicode MS" pitchFamily="34" charset="-128"/>
-                          <a:ea typeface="Arial Unicode MS" pitchFamily="34" charset="-128"/>
-                          <a:cs typeface="Arial Unicode MS" pitchFamily="34" charset="-128"/>
-                          <a:sym typeface="Helvetica Neue Light" charset="0"/>
-                        </a:rPr>
-                        <a:t>Office and Back </a:t>
-                      </a:r>
-                      <a:r>
-                        <a:rPr kumimoji="0" lang="en-US" sz="1900" b="1" i="0" u="none" strike="noStrike" cap="none" normalizeH="0" baseline="0" dirty="0" smtClean="0">
-                          <a:ln>
-                            <a:noFill/>
-                          </a:ln>
-                          <a:solidFill>
-                            <a:srgbClr val="333333"/>
-                          </a:solidFill>
-                          <a:effectLst/>
-                          <a:latin typeface="Arial Unicode MS" pitchFamily="34" charset="-128"/>
-                          <a:ea typeface="Arial Unicode MS" pitchFamily="34" charset="-128"/>
-                          <a:cs typeface="Arial Unicode MS" pitchFamily="34" charset="-128"/>
-                          <a:sym typeface="Helvetica Neue Light" charset="0"/>
-                        </a:rPr>
-                        <a:t>Office</a:t>
+                        <a:t>and Back Office</a:t>
                       </a:r>
                       <a:endParaRPr kumimoji="0" lang="en-US" sz="1900" b="1" i="0" u="none" strike="noStrike" cap="none" normalizeH="0" baseline="0" dirty="0" smtClean="0">
                         <a:ln>
@@ -12904,7 +12830,7 @@
                           <a:cs typeface="Arial Unicode MS" pitchFamily="34" charset="-128"/>
                           <a:sym typeface="Helvetica Neue Light" charset="0"/>
                         </a:rPr>
-                        <a:t>eXo Content Features, eXo Content Customization, eXo </a:t>
+                        <a:t>eXo Content </a:t>
                       </a:r>
                       <a:r>
                         <a:rPr kumimoji="0" lang="en-US" sz="1900" b="1" i="0" u="none" strike="noStrike" cap="none" normalizeH="0" baseline="0" dirty="0" smtClean="0">
@@ -12920,7 +12846,7 @@
                           <a:cs typeface="Arial Unicode MS" pitchFamily="34" charset="-128"/>
                           <a:sym typeface="Helvetica Neue Light" charset="0"/>
                         </a:rPr>
-                        <a:t>Collaboration, eXo Knowledge, </a:t>
+                        <a:t>Features and Customization</a:t>
                       </a:r>
                       <a:r>
                         <a:rPr kumimoji="0" lang="en-US" sz="1900" b="1" i="0" u="none" strike="noStrike" cap="none" normalizeH="0" baseline="0" dirty="0" smtClean="0">
@@ -12936,23 +12862,7 @@
                           <a:cs typeface="Arial Unicode MS" pitchFamily="34" charset="-128"/>
                           <a:sym typeface="Helvetica Neue Light" charset="0"/>
                         </a:rPr>
-                        <a:t>eXo Social, </a:t>
-                      </a:r>
-                      <a:r>
-                        <a:rPr kumimoji="0" lang="en-US" sz="1900" b="1" i="0" u="none" strike="noStrike" cap="none" normalizeH="0" baseline="0" dirty="0" smtClean="0">
-                          <a:ln>
-                            <a:noFill/>
-                          </a:ln>
-                          <a:solidFill>
-                            <a:srgbClr val="333333"/>
-                          </a:solidFill>
-                          <a:effectLst/>
-                          <a:latin typeface="Arial Unicode MS" pitchFamily="34" charset="-128"/>
-                          <a:ea typeface="Arial Unicode MS" pitchFamily="34" charset="-128"/>
-                          <a:cs typeface="Arial Unicode MS" pitchFamily="34" charset="-128"/>
-                          <a:sym typeface="Helvetica Neue Light" charset="0"/>
-                        </a:rPr>
-                        <a:t>Q &amp; A</a:t>
+                        <a:t>, eXo Collaboration, eXo Knowledge, eXo Social, Q &amp; A</a:t>
                       </a:r>
                     </a:p>
                   </a:txBody>
@@ -13023,7 +12933,7 @@
 </p:sld>
 </file>
 
-<file path=ppt/slides/slide6.xml><?xml version="1.0" encoding="utf-8"?>
+<file path=ppt/slides/slide5.xml><?xml version="1.0" encoding="utf-8"?>
 <p:sld xmlns:a="http://schemas.openxmlformats.org/drawingml/2006/main" xmlns:r="http://schemas.openxmlformats.org/officeDocument/2006/relationships" xmlns:p="http://schemas.openxmlformats.org/presentationml/2006/main">
   <p:cSld>
     <p:spTree>
@@ -13097,31 +13007,10 @@
           <a:p>
             <a:pPr lvl="1"/>
             <a:r>
-              <a:rPr lang="en-US" b="0" dirty="0" smtClean="0"/>
-              <a:t>Eclipse</a:t>
-            </a:r>
-          </a:p>
-          <a:p>
-            <a:pPr lvl="1"/>
-            <a:r>
-              <a:rPr lang="en-US" b="0" dirty="0" smtClean="0"/>
-              <a:t>Maven</a:t>
-            </a:r>
-          </a:p>
-          <a:p>
-            <a:pPr lvl="1"/>
-            <a:r>
-              <a:rPr lang="en-US" b="0" dirty="0" smtClean="0"/>
-              <a:t>Maven Repository</a:t>
-            </a:r>
-            <a:endParaRPr lang="en-US" b="0" dirty="0" smtClean="0"/>
-          </a:p>
-          <a:p>
-            <a:pPr lvl="1"/>
-            <a:r>
               <a:rPr lang="en-US" dirty="0" smtClean="0"/>
               <a:t>Slides</a:t>
             </a:r>
+            <a:endParaRPr lang="en-US" dirty="0" smtClean="0"/>
           </a:p>
           <a:p>
             <a:pPr marL="219361" indent="-216749"/>
@@ -13133,27 +13022,14 @@
             </a:pPr>
             <a:r>
               <a:rPr lang="en-US" dirty="0" smtClean="0"/>
-              <a:t>Other </a:t>
-            </a:r>
+              <a:t>Other Resources:</a:t>
+            </a:r>
+          </a:p>
+          <a:p>
+            <a:pPr lvl="1"/>
             <a:r>
               <a:rPr lang="en-US" dirty="0" smtClean="0"/>
-              <a:t>Resources:</a:t>
-            </a:r>
-            <a:endParaRPr lang="en-US" dirty="0" smtClean="0"/>
-          </a:p>
-          <a:p>
-            <a:pPr lvl="1"/>
-            <a:r>
-              <a:rPr lang="en-US" dirty="0" smtClean="0"/>
-              <a:t>http</a:t>
-            </a:r>
-            <a:r>
-              <a:rPr lang="en-US" dirty="0" smtClean="0"/>
-              <a:t>://www.exoplatform.com</a:t>
-            </a:r>
-            <a:r>
-              <a:rPr lang="en-US" dirty="0" smtClean="0"/>
-              <a:t>/</a:t>
+              <a:t>http://www.exoplatform.com/</a:t>
             </a:r>
           </a:p>
           <a:p>
@@ -14773,4 +14649,289 @@
   </a:objectDefaults>
   <a:extraClrSchemeLst/>
 </a:theme>
+</file>
+
+<file path=ppt/theme/theme4.xml><?xml version="1.0" encoding="utf-8"?>
+<a:theme xmlns:a="http://schemas.openxmlformats.org/drawingml/2006/main" name="Tema do Office">
+  <a:themeElements>
+    <a:clrScheme name="Office">
+      <a:dk1>
+        <a:sysClr val="windowText" lastClr="000000"/>
+      </a:dk1>
+      <a:lt1>
+        <a:sysClr val="window" lastClr="FFFFFF"/>
+      </a:lt1>
+      <a:dk2>
+        <a:srgbClr val="1F497D"/>
+      </a:dk2>
+      <a:lt2>
+        <a:srgbClr val="EEECE1"/>
+      </a:lt2>
+      <a:accent1>
+        <a:srgbClr val="4F81BD"/>
+      </a:accent1>
+      <a:accent2>
+        <a:srgbClr val="C0504D"/>
+      </a:accent2>
+      <a:accent3>
+        <a:srgbClr val="9BBB59"/>
+      </a:accent3>
+      <a:accent4>
+        <a:srgbClr val="8064A2"/>
+      </a:accent4>
+      <a:accent5>
+        <a:srgbClr val="4BACC6"/>
+      </a:accent5>
+      <a:accent6>
+        <a:srgbClr val="F79646"/>
+      </a:accent6>
+      <a:hlink>
+        <a:srgbClr val="0000FF"/>
+      </a:hlink>
+      <a:folHlink>
+        <a:srgbClr val="800080"/>
+      </a:folHlink>
+    </a:clrScheme>
+    <a:fontScheme name="Office">
+      <a:majorFont>
+        <a:latin typeface="Calibri"/>
+        <a:ea typeface=""/>
+        <a:cs typeface=""/>
+        <a:font script="Jpan" typeface="ＭＳ Ｐゴシック"/>
+        <a:font script="Hang" typeface="맑은 고딕"/>
+        <a:font script="Hans" typeface="宋体"/>
+        <a:font script="Hant" typeface="新細明體"/>
+        <a:font script="Arab" typeface="Times New Roman"/>
+        <a:font script="Hebr" typeface="Times New Roman"/>
+        <a:font script="Thai" typeface="Angsana New"/>
+        <a:font script="Ethi" typeface="Nyala"/>
+        <a:font script="Beng" typeface="Vrinda"/>
+        <a:font script="Gujr" typeface="Shruti"/>
+        <a:font script="Khmr" typeface="MoolBoran"/>
+        <a:font script="Knda" typeface="Tunga"/>
+        <a:font script="Guru" typeface="Raavi"/>
+        <a:font script="Cans" typeface="Euphemia"/>
+        <a:font script="Cher" typeface="Plantagenet Cherokee"/>
+        <a:font script="Yiii" typeface="Microsoft Yi Baiti"/>
+        <a:font script="Tibt" typeface="Microsoft Himalaya"/>
+        <a:font script="Thaa" typeface="MV Boli"/>
+        <a:font script="Deva" typeface="Mangal"/>
+        <a:font script="Telu" typeface="Gautami"/>
+        <a:font script="Taml" typeface="Latha"/>
+        <a:font script="Syrc" typeface="Estrangelo Edessa"/>
+        <a:font script="Orya" typeface="Kalinga"/>
+        <a:font script="Mlym" typeface="Kartika"/>
+        <a:font script="Laoo" typeface="DokChampa"/>
+        <a:font script="Sinh" typeface="Iskoola Pota"/>
+        <a:font script="Mong" typeface="Mongolian Baiti"/>
+        <a:font script="Viet" typeface="Times New Roman"/>
+        <a:font script="Uigh" typeface="Microsoft Uighur"/>
+        <a:font script="Geor" typeface="Sylfaen"/>
+      </a:majorFont>
+      <a:minorFont>
+        <a:latin typeface="Calibri"/>
+        <a:ea typeface=""/>
+        <a:cs typeface=""/>
+        <a:font script="Jpan" typeface="ＭＳ Ｐゴシック"/>
+        <a:font script="Hang" typeface="맑은 고딕"/>
+        <a:font script="Hans" typeface="宋体"/>
+        <a:font script="Hant" typeface="新細明體"/>
+        <a:font script="Arab" typeface="Arial"/>
+        <a:font script="Hebr" typeface="Arial"/>
+        <a:font script="Thai" typeface="Cordia New"/>
+        <a:font script="Ethi" typeface="Nyala"/>
+        <a:font script="Beng" typeface="Vrinda"/>
+        <a:font script="Gujr" typeface="Shruti"/>
+        <a:font script="Khmr" typeface="DaunPenh"/>
+        <a:font script="Knda" typeface="Tunga"/>
+        <a:font script="Guru" typeface="Raavi"/>
+        <a:font script="Cans" typeface="Euphemia"/>
+        <a:font script="Cher" typeface="Plantagenet Cherokee"/>
+        <a:font script="Yiii" typeface="Microsoft Yi Baiti"/>
+        <a:font script="Tibt" typeface="Microsoft Himalaya"/>
+        <a:font script="Thaa" typeface="MV Boli"/>
+        <a:font script="Deva" typeface="Mangal"/>
+        <a:font script="Telu" typeface="Gautami"/>
+        <a:font script="Taml" typeface="Latha"/>
+        <a:font script="Syrc" typeface="Estrangelo Edessa"/>
+        <a:font script="Orya" typeface="Kalinga"/>
+        <a:font script="Mlym" typeface="Kartika"/>
+        <a:font script="Laoo" typeface="DokChampa"/>
+        <a:font script="Sinh" typeface="Iskoola Pota"/>
+        <a:font script="Mong" typeface="Mongolian Baiti"/>
+        <a:font script="Viet" typeface="Arial"/>
+        <a:font script="Uigh" typeface="Microsoft Uighur"/>
+        <a:font script="Geor" typeface="Sylfaen"/>
+      </a:minorFont>
+    </a:fontScheme>
+    <a:fmtScheme name="Office">
+      <a:fillStyleLst>
+        <a:solidFill>
+          <a:schemeClr val="phClr"/>
+        </a:solidFill>
+        <a:gradFill rotWithShape="1">
+          <a:gsLst>
+            <a:gs pos="0">
+              <a:schemeClr val="phClr">
+                <a:tint val="50000"/>
+                <a:satMod val="300000"/>
+              </a:schemeClr>
+            </a:gs>
+            <a:gs pos="35000">
+              <a:schemeClr val="phClr">
+                <a:tint val="37000"/>
+                <a:satMod val="300000"/>
+              </a:schemeClr>
+            </a:gs>
+            <a:gs pos="100000">
+              <a:schemeClr val="phClr">
+                <a:tint val="15000"/>
+                <a:satMod val="350000"/>
+              </a:schemeClr>
+            </a:gs>
+          </a:gsLst>
+          <a:lin ang="16200000" scaled="1"/>
+        </a:gradFill>
+        <a:gradFill rotWithShape="1">
+          <a:gsLst>
+            <a:gs pos="0">
+              <a:schemeClr val="phClr">
+                <a:shade val="51000"/>
+                <a:satMod val="130000"/>
+              </a:schemeClr>
+            </a:gs>
+            <a:gs pos="80000">
+              <a:schemeClr val="phClr">
+                <a:shade val="93000"/>
+                <a:satMod val="130000"/>
+              </a:schemeClr>
+            </a:gs>
+            <a:gs pos="100000">
+              <a:schemeClr val="phClr">
+                <a:shade val="94000"/>
+                <a:satMod val="135000"/>
+              </a:schemeClr>
+            </a:gs>
+          </a:gsLst>
+          <a:lin ang="16200000" scaled="0"/>
+        </a:gradFill>
+      </a:fillStyleLst>
+      <a:lnStyleLst>
+        <a:ln w="9525" cap="flat" cmpd="sng" algn="ctr">
+          <a:solidFill>
+            <a:schemeClr val="phClr">
+              <a:shade val="95000"/>
+              <a:satMod val="105000"/>
+            </a:schemeClr>
+          </a:solidFill>
+          <a:prstDash val="solid"/>
+        </a:ln>
+        <a:ln w="25400" cap="flat" cmpd="sng" algn="ctr">
+          <a:solidFill>
+            <a:schemeClr val="phClr"/>
+          </a:solidFill>
+          <a:prstDash val="solid"/>
+        </a:ln>
+        <a:ln w="38100" cap="flat" cmpd="sng" algn="ctr">
+          <a:solidFill>
+            <a:schemeClr val="phClr"/>
+          </a:solidFill>
+          <a:prstDash val="solid"/>
+        </a:ln>
+      </a:lnStyleLst>
+      <a:effectStyleLst>
+        <a:effectStyle>
+          <a:effectLst>
+            <a:outerShdw blurRad="40000" dist="20000" dir="5400000" rotWithShape="0">
+              <a:srgbClr val="000000">
+                <a:alpha val="38000"/>
+              </a:srgbClr>
+            </a:outerShdw>
+          </a:effectLst>
+        </a:effectStyle>
+        <a:effectStyle>
+          <a:effectLst>
+            <a:outerShdw blurRad="40000" dist="23000" dir="5400000" rotWithShape="0">
+              <a:srgbClr val="000000">
+                <a:alpha val="35000"/>
+              </a:srgbClr>
+            </a:outerShdw>
+          </a:effectLst>
+        </a:effectStyle>
+        <a:effectStyle>
+          <a:effectLst>
+            <a:outerShdw blurRad="40000" dist="23000" dir="5400000" rotWithShape="0">
+              <a:srgbClr val="000000">
+                <a:alpha val="35000"/>
+              </a:srgbClr>
+            </a:outerShdw>
+          </a:effectLst>
+          <a:scene3d>
+            <a:camera prst="orthographicFront">
+              <a:rot lat="0" lon="0" rev="0"/>
+            </a:camera>
+            <a:lightRig rig="threePt" dir="t">
+              <a:rot lat="0" lon="0" rev="1200000"/>
+            </a:lightRig>
+          </a:scene3d>
+          <a:sp3d>
+            <a:bevelT w="63500" h="25400"/>
+          </a:sp3d>
+        </a:effectStyle>
+      </a:effectStyleLst>
+      <a:bgFillStyleLst>
+        <a:solidFill>
+          <a:schemeClr val="phClr"/>
+        </a:solidFill>
+        <a:gradFill rotWithShape="1">
+          <a:gsLst>
+            <a:gs pos="0">
+              <a:schemeClr val="phClr">
+                <a:tint val="40000"/>
+                <a:satMod val="350000"/>
+              </a:schemeClr>
+            </a:gs>
+            <a:gs pos="40000">
+              <a:schemeClr val="phClr">
+                <a:tint val="45000"/>
+                <a:shade val="99000"/>
+                <a:satMod val="350000"/>
+              </a:schemeClr>
+            </a:gs>
+            <a:gs pos="100000">
+              <a:schemeClr val="phClr">
+                <a:shade val="20000"/>
+                <a:satMod val="255000"/>
+              </a:schemeClr>
+            </a:gs>
+          </a:gsLst>
+          <a:path path="circle">
+            <a:fillToRect l="50000" t="-80000" r="50000" b="180000"/>
+          </a:path>
+        </a:gradFill>
+        <a:gradFill rotWithShape="1">
+          <a:gsLst>
+            <a:gs pos="0">
+              <a:schemeClr val="phClr">
+                <a:tint val="80000"/>
+                <a:satMod val="300000"/>
+              </a:schemeClr>
+            </a:gs>
+            <a:gs pos="100000">
+              <a:schemeClr val="phClr">
+                <a:shade val="30000"/>
+                <a:satMod val="200000"/>
+              </a:schemeClr>
+            </a:gs>
+          </a:gsLst>
+          <a:path path="circle">
+            <a:fillToRect l="50000" t="50000" r="50000" b="50000"/>
+          </a:path>
+        </a:gradFill>
+      </a:bgFillStyleLst>
+    </a:fmtScheme>
+  </a:themeElements>
+  <a:objectDefaults/>
+  <a:extraClrSchemeLst/>
+</a:theme>
 </file>
</xml_diff>

<commit_message>
training review with Soren
</commit_message>
<xml_diff>
--- a/slides/exo-fundamentals/en/010-General-Intro-XFund-en.pptx
+++ b/slides/exo-fundamentals/en/010-General-Intro-XFund-en.pptx
@@ -270,7 +270,7 @@
           <a:p>
             <a:fld id="{FF739C1B-3EDC-4CA0-AE44-236A34CC0AAD}" type="datetimeFigureOut">
               <a:rPr lang="fr-FR" smtClean="0"/>
-              <a:t>26/09/2010</a:t>
+              <a:t>11/01/12</a:t>
             </a:fld>
             <a:endParaRPr lang="fr-FR"/>
           </a:p>
@@ -336,7 +336,7 @@
           <a:p>
             <a:fld id="{FB7DF5D1-C9B2-4756-B5CC-F12249319401}" type="slidenum">
               <a:rPr lang="fr-FR" smtClean="0"/>
-              <a:t>‹nº›</a:t>
+              <a:t>‹#›</a:t>
             </a:fld>
             <a:endParaRPr lang="fr-FR"/>
           </a:p>
@@ -862,7 +862,7 @@
             <a:fld id="{8C54DCBC-1FA6-4D91-9295-DE7087ED7B51}" type="slidenum">
               <a:rPr lang="en-GB"/>
               <a:pPr/>
-              <a:t>‹nº›</a:t>
+              <a:t>‹#›</a:t>
             </a:fld>
             <a:endParaRPr lang="en-GB"/>
           </a:p>
@@ -1725,7 +1725,7 @@
                   <a:tab pos="9144000" algn="l"/>
                 </a:tabLst>
               </a:pPr>
-              <a:t>‹nº›</a:t>
+              <a:t>‹#›</a:t>
             </a:fld>
             <a:endParaRPr lang="en-GB" sz="1400">
               <a:solidFill>
@@ -2021,7 +2021,7 @@
   <p:clrMapOvr>
     <a:masterClrMapping/>
   </p:clrMapOvr>
-  <p:transition/>
+  <p:transition xmlns:p14="http://schemas.microsoft.com/office/powerpoint/2010/main"/>
 </p:sldLayout>
 </file>
 
@@ -2140,7 +2140,7 @@
                   <a:tab pos="9144000" algn="l"/>
                 </a:tabLst>
               </a:pPr>
-              <a:t>‹nº›</a:t>
+              <a:t>‹#›</a:t>
             </a:fld>
             <a:endParaRPr lang="en-GB" sz="1400">
               <a:solidFill>
@@ -2608,7 +2608,7 @@
                   <a:tab pos="9144000" algn="l"/>
                 </a:tabLst>
               </a:pPr>
-              <a:t>‹nº›</a:t>
+              <a:t>‹#›</a:t>
             </a:fld>
             <a:endParaRPr lang="en-GB" sz="1400">
               <a:solidFill>
@@ -2767,7 +2767,7 @@
                   <a:tab pos="9144000" algn="l"/>
                 </a:tabLst>
               </a:pPr>
-              <a:t>‹nº›</a:t>
+              <a:t>‹#›</a:t>
             </a:fld>
             <a:endParaRPr lang="en-GB" sz="1400">
               <a:solidFill>
@@ -2903,7 +2903,7 @@
                   <a:tab pos="9144000" algn="l"/>
                 </a:tabLst>
               </a:pPr>
-              <a:t>‹nº›</a:t>
+              <a:t>‹#›</a:t>
             </a:fld>
             <a:endParaRPr lang="en-GB" sz="1400">
               <a:solidFill>
@@ -3221,7 +3221,7 @@
                   <a:tab pos="9144000" algn="l"/>
                 </a:tabLst>
               </a:pPr>
-              <a:t>‹nº›</a:t>
+              <a:t>‹#›</a:t>
             </a:fld>
             <a:endParaRPr lang="en-GB" sz="1400">
               <a:solidFill>
@@ -3519,7 +3519,7 @@
                   <a:tab pos="9144000" algn="l"/>
                 </a:tabLst>
               </a:pPr>
-              <a:t>‹nº›</a:t>
+              <a:t>‹#›</a:t>
             </a:fld>
             <a:endParaRPr lang="en-GB" sz="1400">
               <a:solidFill>
@@ -3730,7 +3730,7 @@
                   <a:tab pos="9144000" algn="l"/>
                 </a:tabLst>
               </a:pPr>
-              <a:t>‹nº›</a:t>
+              <a:t>‹#›</a:t>
             </a:fld>
             <a:endParaRPr lang="en-GB" sz="1400">
               <a:solidFill>
@@ -4169,7 +4169,7 @@
                   <a:tab pos="9144000" algn="l"/>
                 </a:tabLst>
               </a:pPr>
-              <a:t>‹nº›</a:t>
+              <a:t>‹#›</a:t>
             </a:fld>
             <a:endParaRPr lang="en-GB" sz="1400">
               <a:solidFill>
@@ -4820,7 +4820,7 @@
   <p:clrMapOvr>
     <a:masterClrMapping/>
   </p:clrMapOvr>
-  <p:transition/>
+  <p:transition xmlns:p14="http://schemas.microsoft.com/office/powerpoint/2010/main"/>
 </p:sldLayout>
 </file>
 
@@ -5209,7 +5209,7 @@
   <p:clrMapOvr>
     <a:masterClrMapping/>
   </p:clrMapOvr>
-  <p:transition/>
+  <p:transition xmlns:p14="http://schemas.microsoft.com/office/powerpoint/2010/main"/>
 </p:sldLayout>
 </file>
 
@@ -5513,7 +5513,7 @@
   <p:clrMapOvr>
     <a:masterClrMapping/>
   </p:clrMapOvr>
-  <p:transition/>
+  <p:transition xmlns:p14="http://schemas.microsoft.com/office/powerpoint/2010/main"/>
 </p:sldLayout>
 </file>
 
@@ -5817,7 +5817,7 @@
   <p:clrMapOvr>
     <a:masterClrMapping/>
   </p:clrMapOvr>
-  <p:transition/>
+  <p:transition xmlns:p14="http://schemas.microsoft.com/office/powerpoint/2010/main"/>
 </p:sldLayout>
 </file>
 
@@ -6121,7 +6121,7 @@
   <p:clrMapOvr>
     <a:masterClrMapping/>
   </p:clrMapOvr>
-  <p:transition/>
+  <p:transition xmlns:p14="http://schemas.microsoft.com/office/powerpoint/2010/main"/>
 </p:sldLayout>
 </file>
 
@@ -6425,7 +6425,7 @@
   <p:clrMapOvr>
     <a:masterClrMapping/>
   </p:clrMapOvr>
-  <p:transition/>
+  <p:transition xmlns:p14="http://schemas.microsoft.com/office/powerpoint/2010/main"/>
 </p:sldLayout>
 </file>
 
@@ -7697,7 +7697,7 @@
                   <a:tab pos="9144000" algn="l"/>
                 </a:tabLst>
               </a:pPr>
-              <a:t>‹nº›</a:t>
+              <a:t>‹#›</a:t>
             </a:fld>
             <a:endParaRPr lang="en-GB" sz="1400">
               <a:solidFill>
@@ -8026,7 +8026,7 @@
                   <a:tab pos="9144000" algn="l"/>
                 </a:tabLst>
               </a:pPr>
-              <a:t>‹nº›</a:t>
+              <a:t>‹#›</a:t>
             </a:fld>
             <a:endParaRPr lang="en-GB" sz="1400">
               <a:solidFill>
@@ -8237,7 +8237,7 @@
   <p:clrMapOvr>
     <a:masterClrMapping/>
   </p:clrMapOvr>
-  <p:transition/>
+  <p:transition xmlns:p14="http://schemas.microsoft.com/office/powerpoint/2010/main"/>
 </p:sldLayout>
 </file>
 
@@ -8356,7 +8356,7 @@
                   <a:tab pos="9144000" algn="l"/>
                 </a:tabLst>
               </a:pPr>
-              <a:t>‹nº›</a:t>
+              <a:t>‹#›</a:t>
             </a:fld>
             <a:endParaRPr lang="en-GB" sz="1400">
               <a:solidFill>
@@ -8737,7 +8737,7 @@
   <p:clrMapOvr>
     <a:masterClrMapping/>
   </p:clrMapOvr>
-  <p:transition/>
+  <p:transition xmlns:p14="http://schemas.microsoft.com/office/powerpoint/2010/main"/>
 </p:sldLayout>
 </file>
 
@@ -8856,7 +8856,7 @@
                   <a:tab pos="9144000" algn="l"/>
                 </a:tabLst>
               </a:pPr>
-              <a:t>‹nº›</a:t>
+              <a:t>‹#›</a:t>
             </a:fld>
             <a:endParaRPr lang="en-GB" sz="1400">
               <a:solidFill>
@@ -9152,7 +9152,7 @@
   <p:clrMapOvr>
     <a:masterClrMapping/>
   </p:clrMapOvr>
-  <p:transition/>
+  <p:transition xmlns:p14="http://schemas.microsoft.com/office/powerpoint/2010/main"/>
 </p:sldLayout>
 </file>
 
@@ -9271,7 +9271,7 @@
                   <a:tab pos="9144000" algn="l"/>
                 </a:tabLst>
               </a:pPr>
-              <a:t>‹nº›</a:t>
+              <a:t>‹#›</a:t>
             </a:fld>
             <a:endParaRPr lang="en-GB" sz="1400">
               <a:solidFill>
@@ -9567,7 +9567,7 @@
   <p:clrMapOvr>
     <a:masterClrMapping/>
   </p:clrMapOvr>
-  <p:transition/>
+  <p:transition xmlns:p14="http://schemas.microsoft.com/office/powerpoint/2010/main"/>
 </p:sldLayout>
 </file>
 
@@ -9686,7 +9686,7 @@
                   <a:tab pos="9144000" algn="l"/>
                 </a:tabLst>
               </a:pPr>
-              <a:t>‹nº›</a:t>
+              <a:t>‹#›</a:t>
             </a:fld>
             <a:endParaRPr lang="en-GB" sz="1400">
               <a:solidFill>
@@ -9982,7 +9982,7 @@
   <p:clrMapOvr>
     <a:masterClrMapping/>
   </p:clrMapOvr>
-  <p:transition/>
+  <p:transition xmlns:p14="http://schemas.microsoft.com/office/powerpoint/2010/main"/>
 </p:sldLayout>
 </file>
 
@@ -11077,7 +11077,7 @@
                   <a:tab pos="9144000" algn="l"/>
                 </a:tabLst>
               </a:pPr>
-              <a:t>‹nº›</a:t>
+              <a:t>‹#›</a:t>
             </a:fld>
             <a:endParaRPr lang="en-GB" sz="1400">
               <a:solidFill>
@@ -11866,13 +11866,13 @@
   <p:clrMapOvr>
     <a:masterClrMapping/>
   </p:clrMapOvr>
-  <p:transition spd="med">
+  <p:transition xmlns:p14="http://schemas.microsoft.com/office/powerpoint/2010/main" spd="med">
     <p:wipe dir="r"/>
   </p:transition>
   <p:timing>
     <p:tnLst>
       <p:par>
-        <p:cTn id="1" dur="indefinite" restart="never" nodeType="tmRoot">
+        <p:cTn xmlns:p14="http://schemas.microsoft.com/office/powerpoint/2010/main" id="1" dur="indefinite" restart="never" nodeType="tmRoot">
           <p:childTnLst>
             <p:seq concurrent="1" nextAc="seek">
               <p:cTn id="2" dur="indefinite" nodeType="mainSeq"/>
@@ -12164,13 +12164,13 @@
   <p:clrMapOvr>
     <a:masterClrMapping/>
   </p:clrMapOvr>
-  <p:transition spd="med">
+  <p:transition xmlns:p14="http://schemas.microsoft.com/office/powerpoint/2010/main" spd="med">
     <p:wipe dir="r"/>
   </p:transition>
   <p:timing>
     <p:tnLst>
       <p:par>
-        <p:cTn id="1" dur="indefinite" restart="never" nodeType="tmRoot">
+        <p:cTn xmlns:p14="http://schemas.microsoft.com/office/powerpoint/2010/main" id="1" dur="indefinite" restart="never" nodeType="tmRoot">
           <p:childTnLst>
             <p:seq concurrent="1" nextAc="seek">
               <p:cTn id="2" dur="indefinite" nodeType="mainSeq"/>
@@ -12293,15 +12293,7 @@
             <a:pPr marL="584962" lvl="1" indent="-219361"/>
             <a:r>
               <a:rPr lang="en-US" dirty="0" smtClean="0"/>
-              <a:t>All </a:t>
-            </a:r>
-            <a:r>
-              <a:rPr lang="en-US" dirty="0" smtClean="0"/>
-              <a:t>functional knowledge about these </a:t>
-            </a:r>
-            <a:r>
-              <a:rPr lang="en-US" dirty="0" smtClean="0"/>
-              <a:t>products</a:t>
+              <a:t>All functional knowledge about these products</a:t>
             </a:r>
           </a:p>
           <a:p>
@@ -12310,7 +12302,6 @@
               <a:rPr lang="en-US" dirty="0" smtClean="0"/>
               <a:t>Being able to make presentations about these products</a:t>
             </a:r>
-            <a:endParaRPr lang="en-US" dirty="0" smtClean="0"/>
           </a:p>
           <a:p>
             <a:pPr marL="584962" lvl="1" indent="-219361"/>
@@ -12324,25 +12315,15 @@
             </a:r>
             <a:r>
               <a:rPr lang="en-US" dirty="0" smtClean="0"/>
-              <a:t>and</a:t>
-            </a:r>
+              <a:t>and administrate these products</a:t>
+            </a:r>
+          </a:p>
+          <a:p>
+            <a:pPr marL="584962" lvl="1" indent="-219361"/>
             <a:r>
               <a:rPr lang="en-US" dirty="0" smtClean="0"/>
-              <a:t> administrate these products</a:t>
-            </a:r>
-            <a:endParaRPr lang="en-US" dirty="0" smtClean="0"/>
-          </a:p>
-          <a:p>
-            <a:pPr marL="584962" lvl="1" indent="-219361"/>
-            <a:r>
-              <a:rPr lang="en-US" dirty="0" smtClean="0"/>
-              <a:t>No </a:t>
-            </a:r>
-            <a:r>
-              <a:rPr lang="en-US" dirty="0" smtClean="0"/>
-              <a:t>coding!</a:t>
-            </a:r>
-            <a:endParaRPr lang="en-US" dirty="0" smtClean="0"/>
+              <a:t>No coding!</a:t>
+            </a:r>
           </a:p>
         </p:txBody>
       </p:sp>
@@ -12351,11 +12332,11 @@
   <p:clrMapOvr>
     <a:masterClrMapping/>
   </p:clrMapOvr>
-  <p:transition/>
+  <p:transition xmlns:p14="http://schemas.microsoft.com/office/powerpoint/2010/main"/>
   <p:timing>
     <p:tnLst>
       <p:par>
-        <p:cTn id="1" dur="indefinite" restart="never" nodeType="tmRoot"/>
+        <p:cTn xmlns:p14="http://schemas.microsoft.com/office/powerpoint/2010/main" id="1" dur="indefinite" restart="never" nodeType="tmRoot"/>
       </p:par>
     </p:tnLst>
   </p:timing>
@@ -12416,7 +12397,7 @@
           <p:nvPr>
             <p:extLst>
               <p:ext uri="{D42A27DB-BD31-4B8C-83A1-F6EECF244321}">
-                <p14:modId xmlns:p14="http://schemas.microsoft.com/office/powerpoint/2010/main" val="2961798941"/>
+                <p14:modId xmlns:p14="http://schemas.microsoft.com/office/powerpoint/2010/main" val="2317203459"/>
               </p:ext>
             </p:extLst>
           </p:nvPr>
@@ -12559,39 +12540,7 @@
                           <a:cs typeface="Arial Unicode MS" pitchFamily="34" charset="-128"/>
                           <a:sym typeface="Helvetica Neue Light" charset="0"/>
                         </a:rPr>
-                        <a:t>Introduction, eXo Portal/GateIn </a:t>
-                      </a:r>
-                      <a:r>
-                        <a:rPr kumimoji="0" lang="en-US" sz="1900" b="1" i="0" u="none" strike="noStrike" cap="none" normalizeH="0" baseline="0" dirty="0" smtClean="0">
-                          <a:ln>
-                            <a:noFill/>
-                          </a:ln>
-                          <a:solidFill>
-                            <a:srgbClr val="333333"/>
-                          </a:solidFill>
-                          <a:effectLst/>
-                          <a:latin typeface="Arial Unicode MS" pitchFamily="34" charset="-128"/>
-                          <a:ea typeface="Arial Unicode MS" pitchFamily="34" charset="-128"/>
-                          <a:cs typeface="Arial Unicode MS" pitchFamily="34" charset="-128"/>
-                          <a:sym typeface="Helvetica Neue Light" charset="0"/>
-                        </a:rPr>
-                        <a:t>Presentation</a:t>
-                      </a:r>
-                      <a:r>
-                        <a:rPr kumimoji="0" lang="en-US" sz="1900" b="1" i="0" u="none" strike="noStrike" cap="none" normalizeH="0" baseline="0" dirty="0" smtClean="0">
-                          <a:ln>
-                            <a:noFill/>
-                          </a:ln>
-                          <a:solidFill>
-                            <a:srgbClr val="333333"/>
-                          </a:solidFill>
-                          <a:effectLst/>
-                          <a:latin typeface="Arial Unicode MS" pitchFamily="34" charset="-128"/>
-                          <a:ea typeface="Arial Unicode MS" pitchFamily="34" charset="-128"/>
-                          <a:cs typeface="Arial Unicode MS" pitchFamily="34" charset="-128"/>
-                          <a:sym typeface="Helvetica Neue Light" charset="0"/>
-                        </a:rPr>
-                        <a:t>, GateIn Front Office and </a:t>
+                        <a:t>Introduction, eXo Portal/GateIn Presentation, GateIn Front Office and </a:t>
                       </a:r>
                       <a:r>
                         <a:rPr kumimoji="0" lang="en-US" sz="1900" b="1" i="0" u="none" strike="noStrike" cap="none" normalizeH="0" baseline="0" dirty="0" err="1" smtClean="0">
@@ -12623,7 +12572,7 @@
                           <a:cs typeface="Arial Unicode MS" pitchFamily="34" charset="-128"/>
                           <a:sym typeface="Helvetica Neue Light" charset="0"/>
                         </a:rPr>
-                        <a:t>, eXo Content Front Office </a:t>
+                        <a:t>, eXo Content Front </a:t>
                       </a:r>
                       <a:r>
                         <a:rPr kumimoji="0" lang="en-US" sz="1900" b="1" i="0" u="none" strike="noStrike" cap="none" normalizeH="0" baseline="0" dirty="0" smtClean="0">
@@ -12639,7 +12588,7 @@
                           <a:cs typeface="Arial Unicode MS" pitchFamily="34" charset="-128"/>
                           <a:sym typeface="Helvetica Neue Light" charset="0"/>
                         </a:rPr>
-                        <a:t>and Back Office</a:t>
+                        <a:t>Office</a:t>
                       </a:r>
                       <a:endParaRPr kumimoji="0" lang="en-US" sz="1900" b="1" i="0" u="none" strike="noStrike" cap="none" normalizeH="0" baseline="0" dirty="0" smtClean="0">
                         <a:ln>
@@ -12817,7 +12766,7 @@
                         <a:defRPr/>
                       </a:pPr>
                       <a:r>
-                        <a:rPr kumimoji="0" lang="en-US" sz="1900" b="1" i="0" u="none" strike="noStrike" cap="none" normalizeH="0" baseline="0" dirty="0" smtClean="0">
+                        <a:rPr kumimoji="0" lang="en-US" sz="1900" b="1" i="0" u="none" strike="noStrike" cap="none" normalizeH="0" baseline="0" dirty="0" err="1" smtClean="0">
                           <a:ln>
                             <a:noFill/>
                           </a:ln>
@@ -12830,7 +12779,23 @@
                           <a:cs typeface="Arial Unicode MS" pitchFamily="34" charset="-128"/>
                           <a:sym typeface="Helvetica Neue Light" charset="0"/>
                         </a:rPr>
-                        <a:t>eXo Content </a:t>
+                        <a:t>eXo</a:t>
+                      </a:r>
+                      <a:r>
+                        <a:rPr kumimoji="0" lang="en-US" sz="1900" b="1" i="0" u="none" strike="noStrike" cap="none" normalizeH="0" baseline="0" smtClean="0">
+                          <a:ln>
+                            <a:noFill/>
+                          </a:ln>
+                          <a:solidFill>
+                            <a:srgbClr val="333333"/>
+                          </a:solidFill>
+                          <a:effectLst/>
+                          <a:latin typeface="Arial Unicode MS" pitchFamily="34" charset="-128"/>
+                          <a:ea typeface="Arial Unicode MS" pitchFamily="34" charset="-128"/>
+                          <a:cs typeface="Arial Unicode MS" pitchFamily="34" charset="-128"/>
+                          <a:sym typeface="Helvetica Neue Light" charset="0"/>
+                        </a:rPr>
+                        <a:t> Content Back </a:t>
                       </a:r>
                       <a:r>
                         <a:rPr kumimoji="0" lang="en-US" sz="1900" b="1" i="0" u="none" strike="noStrike" cap="none" normalizeH="0" baseline="0" dirty="0" smtClean="0">
@@ -12846,7 +12811,23 @@
                           <a:cs typeface="Arial Unicode MS" pitchFamily="34" charset="-128"/>
                           <a:sym typeface="Helvetica Neue Light" charset="0"/>
                         </a:rPr>
-                        <a:t>Features and Customization</a:t>
+                        <a:t>Office, </a:t>
+                      </a:r>
+                      <a:r>
+                        <a:rPr kumimoji="0" lang="en-US" sz="1900" b="1" i="0" u="none" strike="noStrike" cap="none" normalizeH="0" baseline="0" dirty="0" err="1" smtClean="0">
+                          <a:ln>
+                            <a:noFill/>
+                          </a:ln>
+                          <a:solidFill>
+                            <a:srgbClr val="333333"/>
+                          </a:solidFill>
+                          <a:effectLst/>
+                          <a:latin typeface="Arial Unicode MS" pitchFamily="34" charset="-128"/>
+                          <a:ea typeface="Arial Unicode MS" pitchFamily="34" charset="-128"/>
+                          <a:cs typeface="Arial Unicode MS" pitchFamily="34" charset="-128"/>
+                          <a:sym typeface="Helvetica Neue Light" charset="0"/>
+                        </a:rPr>
+                        <a:t>eXo</a:t>
                       </a:r>
                       <a:r>
                         <a:rPr kumimoji="0" lang="en-US" sz="1900" b="1" i="0" u="none" strike="noStrike" cap="none" normalizeH="0" baseline="0" dirty="0" smtClean="0">
@@ -12862,7 +12843,23 @@
                           <a:cs typeface="Arial Unicode MS" pitchFamily="34" charset="-128"/>
                           <a:sym typeface="Helvetica Neue Light" charset="0"/>
                         </a:rPr>
-                        <a:t>, eXo Collaboration, eXo Knowledge, eXo Social, Q &amp; A</a:t>
+                        <a:t> </a:t>
+                      </a:r>
+                      <a:r>
+                        <a:rPr kumimoji="0" lang="en-US" sz="1900" b="1" i="0" u="none" strike="noStrike" cap="none" normalizeH="0" baseline="0" dirty="0" smtClean="0">
+                          <a:ln>
+                            <a:noFill/>
+                          </a:ln>
+                          <a:solidFill>
+                            <a:srgbClr val="333333"/>
+                          </a:solidFill>
+                          <a:effectLst/>
+                          <a:latin typeface="Arial Unicode MS" pitchFamily="34" charset="-128"/>
+                          <a:ea typeface="Arial Unicode MS" pitchFamily="34" charset="-128"/>
+                          <a:cs typeface="Arial Unicode MS" pitchFamily="34" charset="-128"/>
+                          <a:sym typeface="Helvetica Neue Light" charset="0"/>
+                        </a:rPr>
+                        <a:t>Content Features and Customization, eXo Collaboration, eXo Knowledge, eXo Social, Q &amp; A</a:t>
                       </a:r>
                     </a:p>
                   </a:txBody>
@@ -12922,11 +12919,11 @@
   <p:clrMapOvr>
     <a:masterClrMapping/>
   </p:clrMapOvr>
-  <p:transition/>
+  <p:transition xmlns:p14="http://schemas.microsoft.com/office/powerpoint/2010/main"/>
   <p:timing>
     <p:tnLst>
       <p:par>
-        <p:cTn id="1" dur="indefinite" restart="never" nodeType="tmRoot"/>
+        <p:cTn xmlns:p14="http://schemas.microsoft.com/office/powerpoint/2010/main" id="1" dur="indefinite" restart="never" nodeType="tmRoot"/>
       </p:par>
     </p:tnLst>
   </p:timing>
@@ -13010,7 +13007,6 @@
               <a:rPr lang="en-US" dirty="0" smtClean="0"/>
               <a:t>Slides</a:t>
             </a:r>
-            <a:endParaRPr lang="en-US" dirty="0" smtClean="0"/>
           </a:p>
           <a:p>
             <a:pPr marL="219361" indent="-216749"/>
@@ -13046,11 +13042,11 @@
   <p:clrMapOvr>
     <a:masterClrMapping/>
   </p:clrMapOvr>
-  <p:transition/>
+  <p:transition xmlns:p14="http://schemas.microsoft.com/office/powerpoint/2010/main"/>
   <p:timing>
     <p:tnLst>
       <p:par>
-        <p:cTn id="1" dur="indefinite" restart="never" nodeType="tmRoot"/>
+        <p:cTn xmlns:p14="http://schemas.microsoft.com/office/powerpoint/2010/main" id="1" dur="indefinite" restart="never" nodeType="tmRoot"/>
       </p:par>
     </p:tnLst>
   </p:timing>

</xml_diff>